<commit_message>
modify storage component sequence diagram
</commit_message>
<xml_diff>
--- a/docs/diagrams/StorageComponentSequenceDiagram.pptx
+++ b/docs/diagrams/StorageComponentSequenceDiagram.pptx
@@ -208,7 +208,7 @@
           <a:p>
             <a:fld id="{F5CC4B3F-88C1-4FFA-B1B6-F41C21DC6924}" type="datetimeFigureOut">
               <a:rPr lang="en-US" smtClean="0"/>
-              <a:t>4/8/18</a:t>
+              <a:t>4/14/18</a:t>
             </a:fld>
             <a:endParaRPr lang="en-US"/>
           </a:p>
@@ -654,7 +654,7 @@
           <a:p>
             <a:fld id="{78C97017-6FC3-485B-9764-EAC9E56C1D49}" type="datetimeFigureOut">
               <a:rPr lang="en-US" smtClean="0"/>
-              <a:t>4/8/18</a:t>
+              <a:t>4/14/18</a:t>
             </a:fld>
             <a:endParaRPr lang="en-US"/>
           </a:p>
@@ -822,7 +822,7 @@
           <a:p>
             <a:fld id="{78C97017-6FC3-485B-9764-EAC9E56C1D49}" type="datetimeFigureOut">
               <a:rPr lang="en-US" smtClean="0"/>
-              <a:t>4/8/18</a:t>
+              <a:t>4/14/18</a:t>
             </a:fld>
             <a:endParaRPr lang="en-US"/>
           </a:p>
@@ -1000,7 +1000,7 @@
           <a:p>
             <a:fld id="{78C97017-6FC3-485B-9764-EAC9E56C1D49}" type="datetimeFigureOut">
               <a:rPr lang="en-US" smtClean="0"/>
-              <a:t>4/8/18</a:t>
+              <a:t>4/14/18</a:t>
             </a:fld>
             <a:endParaRPr lang="en-US"/>
           </a:p>
@@ -1168,7 +1168,7 @@
           <a:p>
             <a:fld id="{78C97017-6FC3-485B-9764-EAC9E56C1D49}" type="datetimeFigureOut">
               <a:rPr lang="en-US" smtClean="0"/>
-              <a:t>4/8/18</a:t>
+              <a:t>4/14/18</a:t>
             </a:fld>
             <a:endParaRPr lang="en-US"/>
           </a:p>
@@ -1413,7 +1413,7 @@
           <a:p>
             <a:fld id="{78C97017-6FC3-485B-9764-EAC9E56C1D49}" type="datetimeFigureOut">
               <a:rPr lang="en-US" smtClean="0"/>
-              <a:t>4/8/18</a:t>
+              <a:t>4/14/18</a:t>
             </a:fld>
             <a:endParaRPr lang="en-US"/>
           </a:p>
@@ -1698,7 +1698,7 @@
           <a:p>
             <a:fld id="{78C97017-6FC3-485B-9764-EAC9E56C1D49}" type="datetimeFigureOut">
               <a:rPr lang="en-US" smtClean="0"/>
-              <a:t>4/8/18</a:t>
+              <a:t>4/14/18</a:t>
             </a:fld>
             <a:endParaRPr lang="en-US"/>
           </a:p>
@@ -2117,7 +2117,7 @@
           <a:p>
             <a:fld id="{78C97017-6FC3-485B-9764-EAC9E56C1D49}" type="datetimeFigureOut">
               <a:rPr lang="en-US" smtClean="0"/>
-              <a:t>4/8/18</a:t>
+              <a:t>4/14/18</a:t>
             </a:fld>
             <a:endParaRPr lang="en-US"/>
           </a:p>
@@ -2234,7 +2234,7 @@
           <a:p>
             <a:fld id="{78C97017-6FC3-485B-9764-EAC9E56C1D49}" type="datetimeFigureOut">
               <a:rPr lang="en-US" smtClean="0"/>
-              <a:t>4/8/18</a:t>
+              <a:t>4/14/18</a:t>
             </a:fld>
             <a:endParaRPr lang="en-US"/>
           </a:p>
@@ -2329,7 +2329,7 @@
           <a:p>
             <a:fld id="{78C97017-6FC3-485B-9764-EAC9E56C1D49}" type="datetimeFigureOut">
               <a:rPr lang="en-US" smtClean="0"/>
-              <a:t>4/8/18</a:t>
+              <a:t>4/14/18</a:t>
             </a:fld>
             <a:endParaRPr lang="en-US"/>
           </a:p>
@@ -2604,7 +2604,7 @@
           <a:p>
             <a:fld id="{78C97017-6FC3-485B-9764-EAC9E56C1D49}" type="datetimeFigureOut">
               <a:rPr lang="en-US" smtClean="0"/>
-              <a:t>4/8/18</a:t>
+              <a:t>4/14/18</a:t>
             </a:fld>
             <a:endParaRPr lang="en-US"/>
           </a:p>
@@ -2856,7 +2856,7 @@
           <a:p>
             <a:fld id="{78C97017-6FC3-485B-9764-EAC9E56C1D49}" type="datetimeFigureOut">
               <a:rPr lang="en-US" smtClean="0"/>
-              <a:t>4/8/18</a:t>
+              <a:t>4/14/18</a:t>
             </a:fld>
             <a:endParaRPr lang="en-US"/>
           </a:p>
@@ -3067,7 +3067,7 @@
           <a:p>
             <a:fld id="{78C97017-6FC3-485B-9764-EAC9E56C1D49}" type="datetimeFigureOut">
               <a:rPr lang="en-US" smtClean="0"/>
-              <a:t>4/8/18</a:t>
+              <a:t>4/14/18</a:t>
             </a:fld>
             <a:endParaRPr lang="en-US"/>
           </a:p>
@@ -3450,8 +3450,8 @@
         </p:nvSpPr>
         <p:spPr>
           <a:xfrm>
-            <a:off x="19050" y="159213"/>
-            <a:ext cx="9906000" cy="5055724"/>
+            <a:off x="171450" y="159213"/>
+            <a:ext cx="8382000" cy="5055724"/>
           </a:xfrm>
           <a:prstGeom prst="roundRect">
             <a:avLst>
@@ -3860,13 +3860,15 @@
       <p:cxnSp>
         <p:nvCxnSpPr>
           <p:cNvPr id="23" name="Straight Arrow Connector 22"/>
-          <p:cNvCxnSpPr/>
+          <p:cNvCxnSpPr>
+            <a:cxnSpLocks/>
+          </p:cNvCxnSpPr>
           <p:nvPr/>
         </p:nvCxnSpPr>
         <p:spPr>
           <a:xfrm>
-            <a:off x="361954" y="1252350"/>
-            <a:ext cx="1119851" cy="0"/>
+            <a:off x="0" y="1250140"/>
+            <a:ext cx="1481805" cy="2210"/>
           </a:xfrm>
           <a:prstGeom prst="straightConnector1">
             <a:avLst/>
@@ -3901,8 +3903,8 @@
         </p:nvSpPr>
         <p:spPr>
           <a:xfrm>
-            <a:off x="5189" y="1239169"/>
-            <a:ext cx="1946834" cy="215444"/>
+            <a:off x="-517072" y="1294156"/>
+            <a:ext cx="1946834" cy="184666"/>
           </a:xfrm>
           <a:prstGeom prst="rect">
             <a:avLst/>
@@ -3917,7 +3919,7 @@
           <a:p>
             <a:pPr algn="r"/>
             <a:r>
-              <a:rPr lang="en-US" altLang="zh-Hans" sz="1400" dirty="0" err="1">
+              <a:rPr lang="en-US" altLang="zh-Hans" sz="1200" dirty="0" err="1">
                 <a:solidFill>
                   <a:srgbClr val="0070C0"/>
                 </a:solidFill>
@@ -3925,7 +3927,7 @@
               <a:t>readEventPlanner</a:t>
             </a:r>
             <a:r>
-              <a:rPr lang="en-US" altLang="zh-Hans" sz="1400" dirty="0">
+              <a:rPr lang="en-US" altLang="zh-Hans" sz="1200" dirty="0">
                 <a:solidFill>
                   <a:srgbClr val="0070C0"/>
                 </a:solidFill>
@@ -3933,14 +3935,14 @@
               <a:t>() </a:t>
             </a:r>
             <a:r>
-              <a:rPr lang="zh-Hans" altLang="en-US" sz="1400" dirty="0">
+              <a:rPr lang="zh-Hans" altLang="en-US" sz="1200" dirty="0">
                 <a:solidFill>
                   <a:srgbClr val="0070C0"/>
                 </a:solidFill>
               </a:rPr>
               <a:t> </a:t>
             </a:r>
-            <a:endParaRPr lang="en-US" sz="1400" dirty="0">
+            <a:endParaRPr lang="en-US" sz="1200" dirty="0">
               <a:solidFill>
                 <a:srgbClr val="0070C0"/>
               </a:solidFill>
@@ -5295,13 +5297,14 @@
           </p:cNvPr>
           <p:cNvCxnSpPr>
             <a:cxnSpLocks/>
+            <a:endCxn id="91" idx="1"/>
           </p:cNvCxnSpPr>
           <p:nvPr/>
         </p:nvCxnSpPr>
         <p:spPr>
           <a:xfrm>
-            <a:off x="7744133" y="3969213"/>
-            <a:ext cx="730872" cy="0"/>
+            <a:off x="7824723" y="3947382"/>
+            <a:ext cx="719591" cy="0"/>
           </a:xfrm>
           <a:prstGeom prst="straightConnector1">
             <a:avLst/>
@@ -5342,7 +5345,7 @@
         </p:nvSpPr>
         <p:spPr>
           <a:xfrm>
-            <a:off x="8469237" y="3756030"/>
+            <a:off x="8544314" y="3756030"/>
             <a:ext cx="1380736" cy="382703"/>
           </a:xfrm>
           <a:prstGeom prst="rect">
@@ -5421,7 +5424,7 @@
         </p:nvSpPr>
         <p:spPr>
           <a:xfrm>
-            <a:off x="9083405" y="4126995"/>
+            <a:off x="9158482" y="4126995"/>
             <a:ext cx="152400" cy="276003"/>
           </a:xfrm>
           <a:prstGeom prst="rect">
@@ -5482,7 +5485,7 @@
         </p:nvCxnSpPr>
         <p:spPr>
           <a:xfrm>
-            <a:off x="9163050" y="4108983"/>
+            <a:off x="9239250" y="4108983"/>
             <a:ext cx="0" cy="1003230"/>
           </a:xfrm>
           <a:prstGeom prst="line">
@@ -5542,6 +5545,52 @@
                 <a:lumMod val="60000"/>
                 <a:lumOff val="40000"/>
               </a:schemeClr>
+            </a:solidFill>
+            <a:prstDash val="sysDash"/>
+            <a:headEnd type="arrow" w="med" len="med"/>
+            <a:tailEnd type="none" w="med" len="med"/>
+          </a:ln>
+        </p:spPr>
+        <p:style>
+          <a:lnRef idx="1">
+            <a:schemeClr val="accent1"/>
+          </a:lnRef>
+          <a:fillRef idx="0">
+            <a:schemeClr val="accent1"/>
+          </a:fillRef>
+          <a:effectRef idx="0">
+            <a:schemeClr val="accent1"/>
+          </a:effectRef>
+          <a:fontRef idx="minor">
+            <a:schemeClr val="tx1"/>
+          </a:fontRef>
+        </p:style>
+      </p:cxnSp>
+      <p:cxnSp>
+        <p:nvCxnSpPr>
+          <p:cNvPr id="44" name="Straight Arrow Connector 43">
+            <a:extLst>
+              <a:ext uri="{FF2B5EF4-FFF2-40B4-BE49-F238E27FC236}">
+                <a16:creationId xmlns:a16="http://schemas.microsoft.com/office/drawing/2014/main" id="{B2E33F41-F398-8843-80A3-1344A4899EE2}"/>
+              </a:ext>
+            </a:extLst>
+          </p:cNvPr>
+          <p:cNvCxnSpPr>
+            <a:cxnSpLocks/>
+          </p:cNvCxnSpPr>
+          <p:nvPr/>
+        </p:nvCxnSpPr>
+        <p:spPr>
+          <a:xfrm>
+            <a:off x="95250" y="4731213"/>
+            <a:ext cx="1386554" cy="0"/>
+          </a:xfrm>
+          <a:prstGeom prst="straightConnector1">
+            <a:avLst/>
+          </a:prstGeom>
+          <a:ln w="19050">
+            <a:solidFill>
+              <a:srgbClr val="0070C0"/>
             </a:solidFill>
             <a:prstDash val="sysDash"/>
             <a:headEnd type="arrow" w="med" len="med"/>

</xml_diff>

<commit_message>
change storage compound sequence diagram
</commit_message>
<xml_diff>
--- a/docs/diagrams/StorageComponentSequenceDiagram.pptx
+++ b/docs/diagrams/StorageComponentSequenceDiagram.pptx
@@ -208,7 +208,7 @@
           <a:p>
             <a:fld id="{F5CC4B3F-88C1-4FFA-B1B6-F41C21DC6924}" type="datetimeFigureOut">
               <a:rPr lang="en-US" smtClean="0"/>
-              <a:t>4/14/18</a:t>
+              <a:t>4/15/18</a:t>
             </a:fld>
             <a:endParaRPr lang="en-US"/>
           </a:p>
@@ -654,7 +654,7 @@
           <a:p>
             <a:fld id="{78C97017-6FC3-485B-9764-EAC9E56C1D49}" type="datetimeFigureOut">
               <a:rPr lang="en-US" smtClean="0"/>
-              <a:t>4/14/18</a:t>
+              <a:t>4/15/18</a:t>
             </a:fld>
             <a:endParaRPr lang="en-US"/>
           </a:p>
@@ -822,7 +822,7 @@
           <a:p>
             <a:fld id="{78C97017-6FC3-485B-9764-EAC9E56C1D49}" type="datetimeFigureOut">
               <a:rPr lang="en-US" smtClean="0"/>
-              <a:t>4/14/18</a:t>
+              <a:t>4/15/18</a:t>
             </a:fld>
             <a:endParaRPr lang="en-US"/>
           </a:p>
@@ -1000,7 +1000,7 @@
           <a:p>
             <a:fld id="{78C97017-6FC3-485B-9764-EAC9E56C1D49}" type="datetimeFigureOut">
               <a:rPr lang="en-US" smtClean="0"/>
-              <a:t>4/14/18</a:t>
+              <a:t>4/15/18</a:t>
             </a:fld>
             <a:endParaRPr lang="en-US"/>
           </a:p>
@@ -1168,7 +1168,7 @@
           <a:p>
             <a:fld id="{78C97017-6FC3-485B-9764-EAC9E56C1D49}" type="datetimeFigureOut">
               <a:rPr lang="en-US" smtClean="0"/>
-              <a:t>4/14/18</a:t>
+              <a:t>4/15/18</a:t>
             </a:fld>
             <a:endParaRPr lang="en-US"/>
           </a:p>
@@ -1413,7 +1413,7 @@
           <a:p>
             <a:fld id="{78C97017-6FC3-485B-9764-EAC9E56C1D49}" type="datetimeFigureOut">
               <a:rPr lang="en-US" smtClean="0"/>
-              <a:t>4/14/18</a:t>
+              <a:t>4/15/18</a:t>
             </a:fld>
             <a:endParaRPr lang="en-US"/>
           </a:p>
@@ -1698,7 +1698,7 @@
           <a:p>
             <a:fld id="{78C97017-6FC3-485B-9764-EAC9E56C1D49}" type="datetimeFigureOut">
               <a:rPr lang="en-US" smtClean="0"/>
-              <a:t>4/14/18</a:t>
+              <a:t>4/15/18</a:t>
             </a:fld>
             <a:endParaRPr lang="en-US"/>
           </a:p>
@@ -2117,7 +2117,7 @@
           <a:p>
             <a:fld id="{78C97017-6FC3-485B-9764-EAC9E56C1D49}" type="datetimeFigureOut">
               <a:rPr lang="en-US" smtClean="0"/>
-              <a:t>4/14/18</a:t>
+              <a:t>4/15/18</a:t>
             </a:fld>
             <a:endParaRPr lang="en-US"/>
           </a:p>
@@ -2234,7 +2234,7 @@
           <a:p>
             <a:fld id="{78C97017-6FC3-485B-9764-EAC9E56C1D49}" type="datetimeFigureOut">
               <a:rPr lang="en-US" smtClean="0"/>
-              <a:t>4/14/18</a:t>
+              <a:t>4/15/18</a:t>
             </a:fld>
             <a:endParaRPr lang="en-US"/>
           </a:p>
@@ -2329,7 +2329,7 @@
           <a:p>
             <a:fld id="{78C97017-6FC3-485B-9764-EAC9E56C1D49}" type="datetimeFigureOut">
               <a:rPr lang="en-US" smtClean="0"/>
-              <a:t>4/14/18</a:t>
+              <a:t>4/15/18</a:t>
             </a:fld>
             <a:endParaRPr lang="en-US"/>
           </a:p>
@@ -2604,7 +2604,7 @@
           <a:p>
             <a:fld id="{78C97017-6FC3-485B-9764-EAC9E56C1D49}" type="datetimeFigureOut">
               <a:rPr lang="en-US" smtClean="0"/>
-              <a:t>4/14/18</a:t>
+              <a:t>4/15/18</a:t>
             </a:fld>
             <a:endParaRPr lang="en-US"/>
           </a:p>
@@ -2856,7 +2856,7 @@
           <a:p>
             <a:fld id="{78C97017-6FC3-485B-9764-EAC9E56C1D49}" type="datetimeFigureOut">
               <a:rPr lang="en-US" smtClean="0"/>
-              <a:t>4/14/18</a:t>
+              <a:t>4/15/18</a:t>
             </a:fld>
             <a:endParaRPr lang="en-US"/>
           </a:p>
@@ -3067,7 +3067,7 @@
           <a:p>
             <a:fld id="{78C97017-6FC3-485B-9764-EAC9E56C1D49}" type="datetimeFigureOut">
               <a:rPr lang="en-US" smtClean="0"/>
-              <a:t>4/14/18</a:t>
+              <a:t>4/15/18</a:t>
             </a:fld>
             <a:endParaRPr lang="en-US"/>
           </a:p>
@@ -3450,7 +3450,7 @@
         </p:nvSpPr>
         <p:spPr>
           <a:xfrm>
-            <a:off x="171450" y="159213"/>
+            <a:off x="149987" y="109537"/>
             <a:ext cx="8382000" cy="5055724"/>
           </a:xfrm>
           <a:prstGeom prst="roundRect">
@@ -3459,13 +3459,18 @@
             </a:avLst>
           </a:prstGeom>
           <a:solidFill>
-            <a:schemeClr val="accent1">
-              <a:lumMod val="20000"/>
-              <a:lumOff val="80000"/>
+            <a:schemeClr val="accent6">
+              <a:lumMod val="40000"/>
+              <a:lumOff val="60000"/>
             </a:schemeClr>
           </a:solidFill>
           <a:ln w="19050">
-            <a:noFill/>
+            <a:solidFill>
+              <a:schemeClr val="accent6">
+                <a:lumMod val="40000"/>
+                <a:lumOff val="60000"/>
+              </a:schemeClr>
+            </a:solidFill>
           </a:ln>
           <a:effectLst/>
         </p:spPr>
@@ -3490,14 +3495,18 @@
             <a:r>
               <a:rPr lang="en-US" altLang="zh-Hans" sz="1200" b="1" dirty="0">
                 <a:solidFill>
-                  <a:srgbClr val="0070C0"/>
+                  <a:schemeClr val="accent6">
+                    <a:lumMod val="75000"/>
+                  </a:schemeClr>
                 </a:solidFill>
               </a:rPr>
               <a:t>Storage</a:t>
             </a:r>
             <a:endParaRPr lang="en-SG" sz="1200" b="1" dirty="0">
               <a:solidFill>
-                <a:srgbClr val="0070C0"/>
+                <a:schemeClr val="accent6">
+                  <a:lumMod val="75000"/>
+                </a:schemeClr>
               </a:solidFill>
             </a:endParaRPr>
           </a:p>
@@ -3518,11 +3527,15 @@
             <a:avLst/>
           </a:prstGeom>
           <a:solidFill>
-            <a:srgbClr val="0070C0"/>
+            <a:schemeClr val="accent6">
+              <a:lumMod val="75000"/>
+            </a:schemeClr>
           </a:solidFill>
           <a:ln w="19050">
             <a:solidFill>
-              <a:srgbClr val="0070C0"/>
+              <a:schemeClr val="accent6">
+                <a:lumMod val="75000"/>
+              </a:schemeClr>
             </a:solidFill>
           </a:ln>
           <a:effectLst/>
@@ -3588,7 +3601,9 @@
           </a:prstGeom>
           <a:ln w="19050">
             <a:solidFill>
-              <a:srgbClr val="0070C0"/>
+              <a:schemeClr val="accent6">
+                <a:lumMod val="75000"/>
+              </a:schemeClr>
             </a:solidFill>
             <a:prstDash val="sysDash"/>
           </a:ln>
@@ -3624,11 +3639,15 @@
             <a:avLst/>
           </a:prstGeom>
           <a:solidFill>
-            <a:srgbClr val="0070C0"/>
+            <a:schemeClr val="accent6">
+              <a:lumMod val="75000"/>
+            </a:schemeClr>
           </a:solidFill>
           <a:ln>
             <a:solidFill>
-              <a:srgbClr val="0070C0"/>
+              <a:schemeClr val="accent6">
+                <a:lumMod val="75000"/>
+              </a:schemeClr>
             </a:solidFill>
           </a:ln>
           <a:effectLst/>
@@ -3671,11 +3690,15 @@
             <a:avLst/>
           </a:prstGeom>
           <a:solidFill>
-            <a:srgbClr val="0070C0"/>
+            <a:schemeClr val="accent6">
+              <a:lumMod val="75000"/>
+            </a:schemeClr>
           </a:solidFill>
           <a:ln w="19050">
             <a:solidFill>
-              <a:srgbClr val="0070C0"/>
+              <a:schemeClr val="accent6">
+                <a:lumMod val="75000"/>
+              </a:schemeClr>
             </a:solidFill>
           </a:ln>
           <a:effectLst/>
@@ -3749,7 +3772,9 @@
           </a:prstGeom>
           <a:ln w="19050">
             <a:solidFill>
-              <a:srgbClr val="0070C0"/>
+              <a:schemeClr val="accent6">
+                <a:lumMod val="75000"/>
+              </a:schemeClr>
             </a:solidFill>
             <a:prstDash val="sysDash"/>
           </a:ln>
@@ -3789,7 +3814,9 @@
           </a:prstGeom>
           <a:ln w="19050">
             <a:solidFill>
-              <a:srgbClr val="0070C0"/>
+              <a:schemeClr val="accent6">
+                <a:lumMod val="75000"/>
+              </a:schemeClr>
             </a:solidFill>
             <a:prstDash val="sysDash"/>
           </a:ln>
@@ -3825,11 +3852,15 @@
             <a:avLst/>
           </a:prstGeom>
           <a:solidFill>
-            <a:srgbClr val="0070C0"/>
+            <a:schemeClr val="accent6">
+              <a:lumMod val="75000"/>
+            </a:schemeClr>
           </a:solidFill>
           <a:ln>
             <a:solidFill>
-              <a:srgbClr val="0070C0"/>
+              <a:schemeClr val="accent6">
+                <a:lumMod val="75000"/>
+              </a:schemeClr>
             </a:solidFill>
           </a:ln>
           <a:effectLst/>
@@ -3921,7 +3952,9 @@
             <a:r>
               <a:rPr lang="en-US" altLang="zh-Hans" sz="1200" dirty="0" err="1">
                 <a:solidFill>
-                  <a:srgbClr val="0070C0"/>
+                  <a:schemeClr val="accent6">
+                    <a:lumMod val="75000"/>
+                  </a:schemeClr>
                 </a:solidFill>
               </a:rPr>
               <a:t>readEventPlanner</a:t>
@@ -3929,7 +3962,9 @@
             <a:r>
               <a:rPr lang="en-US" altLang="zh-Hans" sz="1200" dirty="0">
                 <a:solidFill>
-                  <a:srgbClr val="0070C0"/>
+                  <a:schemeClr val="accent6">
+                    <a:lumMod val="75000"/>
+                  </a:schemeClr>
                 </a:solidFill>
               </a:rPr>
               <a:t>() </a:t>
@@ -3937,14 +3972,18 @@
             <a:r>
               <a:rPr lang="zh-Hans" altLang="en-US" sz="1200" dirty="0">
                 <a:solidFill>
-                  <a:srgbClr val="0070C0"/>
+                  <a:schemeClr val="accent6">
+                    <a:lumMod val="75000"/>
+                  </a:schemeClr>
                 </a:solidFill>
               </a:rPr>
               <a:t> </a:t>
             </a:r>
             <a:endParaRPr lang="en-US" sz="1200" dirty="0">
               <a:solidFill>
-                <a:srgbClr val="0070C0"/>
+                <a:schemeClr val="accent6">
+                  <a:lumMod val="75000"/>
+                </a:schemeClr>
               </a:solidFill>
             </a:endParaRPr>
           </a:p>
@@ -3965,11 +4004,15 @@
             <a:avLst/>
           </a:prstGeom>
           <a:solidFill>
-            <a:srgbClr val="0070C0"/>
+            <a:schemeClr val="accent6">
+              <a:lumMod val="75000"/>
+            </a:schemeClr>
           </a:solidFill>
           <a:ln>
             <a:solidFill>
-              <a:srgbClr val="0070C0"/>
+              <a:schemeClr val="accent6">
+                <a:lumMod val="75000"/>
+              </a:schemeClr>
             </a:solidFill>
           </a:ln>
           <a:effectLst/>
@@ -4015,7 +4058,9 @@
           </a:prstGeom>
           <a:ln w="19050">
             <a:solidFill>
-              <a:srgbClr val="0070C0"/>
+              <a:schemeClr val="accent6">
+                <a:lumMod val="75000"/>
+              </a:schemeClr>
             </a:solidFill>
             <a:tailEnd type="arrow"/>
           </a:ln>
@@ -4069,11 +4114,23 @@
           </a:lstStyle>
           <a:p>
             <a:r>
-              <a:rPr lang="en-US" altLang="zh-Hans" sz="1200" dirty="0" err="1"/>
+              <a:rPr lang="en-US" altLang="zh-Hans" sz="1200" dirty="0" err="1">
+                <a:solidFill>
+                  <a:schemeClr val="accent6">
+                    <a:lumMod val="75000"/>
+                  </a:schemeClr>
+                </a:solidFill>
+              </a:rPr>
               <a:t>loadDataFromFile</a:t>
             </a:r>
             <a:r>
-              <a:rPr lang="en-US" sz="1200" dirty="0"/>
+              <a:rPr lang="en-US" sz="1200" dirty="0">
+                <a:solidFill>
+                  <a:schemeClr val="accent6">
+                    <a:lumMod val="75000"/>
+                  </a:schemeClr>
+                </a:solidFill>
+              </a:rPr>
               <a:t>()</a:t>
             </a:r>
           </a:p>
@@ -4094,11 +4151,15 @@
             <a:avLst/>
           </a:prstGeom>
           <a:solidFill>
-            <a:srgbClr val="0070C0"/>
+            <a:schemeClr val="accent6">
+              <a:lumMod val="75000"/>
+            </a:schemeClr>
           </a:solidFill>
           <a:ln w="19050">
             <a:solidFill>
-              <a:srgbClr val="0070C0"/>
+              <a:schemeClr val="accent6">
+                <a:lumMod val="75000"/>
+              </a:schemeClr>
             </a:solidFill>
           </a:ln>
           <a:effectLst/>
@@ -4172,7 +4233,9 @@
           </a:prstGeom>
           <a:ln w="19050">
             <a:solidFill>
-              <a:srgbClr val="0070C0"/>
+              <a:schemeClr val="accent6">
+                <a:lumMod val="75000"/>
+              </a:schemeClr>
             </a:solidFill>
             <a:prstDash val="sysDash"/>
           </a:ln>
@@ -4208,11 +4271,15 @@
             <a:avLst/>
           </a:prstGeom>
           <a:solidFill>
-            <a:srgbClr val="0070C0"/>
+            <a:schemeClr val="accent6">
+              <a:lumMod val="75000"/>
+            </a:schemeClr>
           </a:solidFill>
           <a:ln>
             <a:solidFill>
-              <a:srgbClr val="0070C0"/>
+              <a:schemeClr val="accent6">
+                <a:lumMod val="75000"/>
+              </a:schemeClr>
             </a:solidFill>
           </a:ln>
           <a:effectLst/>
@@ -4258,7 +4325,9 @@
           </a:prstGeom>
           <a:ln w="19050">
             <a:solidFill>
-              <a:srgbClr val="0070C0"/>
+              <a:schemeClr val="accent6">
+                <a:lumMod val="75000"/>
+              </a:schemeClr>
             </a:solidFill>
             <a:tailEnd type="arrow"/>
           </a:ln>
@@ -4293,11 +4362,15 @@
             <a:avLst/>
           </a:prstGeom>
           <a:solidFill>
-            <a:srgbClr val="0070C0"/>
+            <a:schemeClr val="accent6">
+              <a:lumMod val="75000"/>
+            </a:schemeClr>
           </a:solidFill>
           <a:ln w="19050">
             <a:solidFill>
-              <a:srgbClr val="0070C0"/>
+              <a:schemeClr val="accent6">
+                <a:lumMod val="75000"/>
+              </a:schemeClr>
             </a:solidFill>
           </a:ln>
           <a:effectLst/>
@@ -4370,14 +4443,16 @@
         <p:spPr>
           <a:xfrm>
             <a:off x="1636109" y="1454613"/>
-            <a:ext cx="1954636" cy="0"/>
+            <a:ext cx="1727880" cy="0"/>
           </a:xfrm>
           <a:prstGeom prst="straightConnector1">
             <a:avLst/>
           </a:prstGeom>
           <a:ln w="19050">
             <a:solidFill>
-              <a:srgbClr val="0070C0"/>
+              <a:schemeClr val="accent6">
+                <a:lumMod val="75000"/>
+              </a:schemeClr>
             </a:solidFill>
             <a:tailEnd type="arrow"/>
           </a:ln>
@@ -4421,7 +4496,9 @@
           </a:prstGeom>
           <a:ln w="19050">
             <a:solidFill>
-              <a:srgbClr val="0070C0"/>
+              <a:schemeClr val="accent6">
+                <a:lumMod val="75000"/>
+              </a:schemeClr>
             </a:solidFill>
             <a:prstDash val="sysDash"/>
             <a:headEnd type="arrow" w="med" len="med"/>
@@ -4464,11 +4541,15 @@
             <a:avLst/>
           </a:prstGeom>
           <a:solidFill>
-            <a:srgbClr val="0070C0"/>
+            <a:schemeClr val="accent6">
+              <a:lumMod val="75000"/>
+            </a:schemeClr>
           </a:solidFill>
           <a:ln>
             <a:solidFill>
-              <a:srgbClr val="0070C0"/>
+              <a:schemeClr val="accent6">
+                <a:lumMod val="75000"/>
+              </a:schemeClr>
             </a:solidFill>
           </a:ln>
           <a:effectLst/>
@@ -4517,11 +4598,15 @@
             <a:avLst/>
           </a:prstGeom>
           <a:solidFill>
-            <a:srgbClr val="0070C0"/>
+            <a:schemeClr val="accent6">
+              <a:lumMod val="75000"/>
+            </a:schemeClr>
           </a:solidFill>
           <a:ln>
             <a:solidFill>
-              <a:srgbClr val="0070C0"/>
+              <a:schemeClr val="accent6">
+                <a:lumMod val="75000"/>
+              </a:schemeClr>
             </a:solidFill>
           </a:ln>
           <a:effectLst/>
@@ -4589,11 +4674,23 @@
           </a:lstStyle>
           <a:p>
             <a:r>
-              <a:rPr lang="en-US" sz="1200" dirty="0" err="1"/>
+              <a:rPr lang="en-US" sz="1200" dirty="0" err="1">
+                <a:solidFill>
+                  <a:schemeClr val="accent6">
+                    <a:lumMod val="75000"/>
+                  </a:schemeClr>
+                </a:solidFill>
+              </a:rPr>
               <a:t>toModelType</a:t>
             </a:r>
             <a:r>
-              <a:rPr lang="en-US" sz="1200" dirty="0"/>
+              <a:rPr lang="en-US" sz="1200" dirty="0">
+                <a:solidFill>
+                  <a:schemeClr val="accent6">
+                    <a:lumMod val="75000"/>
+                  </a:schemeClr>
+                </a:solidFill>
+              </a:rPr>
               <a:t>()</a:t>
             </a:r>
           </a:p>
@@ -4623,7 +4720,9 @@
           </a:prstGeom>
           <a:ln w="19050">
             <a:solidFill>
-              <a:srgbClr val="0070C0"/>
+              <a:schemeClr val="accent6">
+                <a:lumMod val="75000"/>
+              </a:schemeClr>
             </a:solidFill>
             <a:tailEnd type="arrow"/>
           </a:ln>
@@ -4664,11 +4763,15 @@
             <a:avLst/>
           </a:prstGeom>
           <a:solidFill>
-            <a:srgbClr val="0070C0"/>
+            <a:schemeClr val="accent6">
+              <a:lumMod val="75000"/>
+            </a:schemeClr>
           </a:solidFill>
           <a:ln w="19050">
             <a:solidFill>
-              <a:srgbClr val="0070C0"/>
+              <a:schemeClr val="accent6">
+                <a:lumMod val="75000"/>
+              </a:schemeClr>
             </a:solidFill>
           </a:ln>
           <a:effectLst/>
@@ -4756,11 +4859,23 @@
           </a:lstStyle>
           <a:p>
             <a:r>
-              <a:rPr lang="en-US" altLang="zh-Hans" sz="1200" dirty="0" err="1"/>
+              <a:rPr lang="en-US" altLang="zh-Hans" sz="1200" dirty="0" err="1">
+                <a:solidFill>
+                  <a:schemeClr val="accent6">
+                    <a:lumMod val="75000"/>
+                  </a:schemeClr>
+                </a:solidFill>
+              </a:rPr>
               <a:t>getDataFromFile</a:t>
             </a:r>
             <a:r>
-              <a:rPr lang="en-US" sz="1200" dirty="0"/>
+              <a:rPr lang="en-US" sz="1200" dirty="0">
+                <a:solidFill>
+                  <a:schemeClr val="accent6">
+                    <a:lumMod val="75000"/>
+                  </a:schemeClr>
+                </a:solidFill>
+              </a:rPr>
               <a:t>()</a:t>
             </a:r>
           </a:p>
@@ -4790,7 +4905,9 @@
           </a:prstGeom>
           <a:ln w="19050">
             <a:solidFill>
-              <a:srgbClr val="0070C0"/>
+              <a:schemeClr val="accent6">
+                <a:lumMod val="75000"/>
+              </a:schemeClr>
             </a:solidFill>
             <a:prstDash val="sysDash"/>
           </a:ln>
@@ -4832,11 +4949,15 @@
             <a:avLst/>
           </a:prstGeom>
           <a:solidFill>
-            <a:srgbClr val="0070C0"/>
+            <a:schemeClr val="accent6">
+              <a:lumMod val="75000"/>
+            </a:schemeClr>
           </a:solidFill>
           <a:ln>
             <a:solidFill>
-              <a:srgbClr val="0070C0"/>
+              <a:schemeClr val="accent6">
+                <a:lumMod val="75000"/>
+              </a:schemeClr>
             </a:solidFill>
           </a:ln>
           <a:effectLst/>
@@ -4888,7 +5009,9 @@
           </a:prstGeom>
           <a:ln w="19050">
             <a:solidFill>
-              <a:srgbClr val="0070C0"/>
+              <a:schemeClr val="accent6">
+                <a:lumMod val="75000"/>
+              </a:schemeClr>
             </a:solidFill>
             <a:prstDash val="sysDash"/>
             <a:headEnd type="arrow" w="med" len="med"/>
@@ -4931,11 +5054,15 @@
             <a:avLst/>
           </a:prstGeom>
           <a:solidFill>
-            <a:srgbClr val="0070C0"/>
+            <a:schemeClr val="accent6">
+              <a:lumMod val="75000"/>
+            </a:schemeClr>
           </a:solidFill>
           <a:ln>
             <a:solidFill>
-              <a:srgbClr val="0070C0"/>
+              <a:schemeClr val="accent6">
+                <a:lumMod val="75000"/>
+              </a:schemeClr>
             </a:solidFill>
           </a:ln>
           <a:effectLst/>
@@ -4987,7 +5114,9 @@
           </a:prstGeom>
           <a:ln w="19050">
             <a:solidFill>
-              <a:srgbClr val="0070C0"/>
+              <a:schemeClr val="accent6">
+                <a:lumMod val="75000"/>
+              </a:schemeClr>
             </a:solidFill>
             <a:tailEnd type="arrow"/>
           </a:ln>
@@ -5028,6 +5157,9 @@
             <a:avLst/>
           </a:prstGeom>
           <a:noFill/>
+          <a:ln>
+            <a:noFill/>
+          </a:ln>
         </p:spPr>
         <p:txBody>
           <a:bodyPr wrap="square" lIns="0" tIns="0" rIns="0" bIns="0" rtlCol="0">
@@ -5047,11 +5179,23 @@
           </a:lstStyle>
           <a:p>
             <a:r>
-              <a:rPr lang="en-US" sz="1200" dirty="0" err="1"/>
+              <a:rPr lang="en-US" sz="1200" dirty="0" err="1">
+                <a:solidFill>
+                  <a:schemeClr val="accent6">
+                    <a:lumMod val="75000"/>
+                  </a:schemeClr>
+                </a:solidFill>
+              </a:rPr>
               <a:t>newInstance</a:t>
             </a:r>
             <a:r>
-              <a:rPr lang="en-US" sz="1200" dirty="0"/>
+              <a:rPr lang="en-US" sz="1200" dirty="0">
+                <a:solidFill>
+                  <a:schemeClr val="accent6">
+                    <a:lumMod val="75000"/>
+                  </a:schemeClr>
+                </a:solidFill>
+              </a:rPr>
               <a:t>()</a:t>
             </a:r>
           </a:p>
@@ -5081,7 +5225,9 @@
           </a:prstGeom>
           <a:ln w="19050">
             <a:solidFill>
-              <a:srgbClr val="0070C0"/>
+              <a:schemeClr val="accent6">
+                <a:lumMod val="75000"/>
+              </a:schemeClr>
             </a:solidFill>
             <a:tailEnd type="arrow"/>
           </a:ln>
@@ -5125,7 +5271,9 @@
           </a:prstGeom>
           <a:ln w="19050">
             <a:solidFill>
-              <a:srgbClr val="0070C0"/>
+              <a:schemeClr val="accent6">
+                <a:lumMod val="75000"/>
+              </a:schemeClr>
             </a:solidFill>
             <a:prstDash val="sysDash"/>
             <a:headEnd type="arrow" w="med" len="med"/>
@@ -5171,7 +5319,9 @@
           </a:prstGeom>
           <a:ln w="19050">
             <a:solidFill>
-              <a:srgbClr val="0070C0"/>
+              <a:schemeClr val="accent6">
+                <a:lumMod val="75000"/>
+              </a:schemeClr>
             </a:solidFill>
             <a:prstDash val="sysDash"/>
             <a:headEnd type="arrow" w="med" len="med"/>
@@ -5210,14 +5360,16 @@
         <p:spPr>
           <a:xfrm>
             <a:off x="1645891" y="3588213"/>
-            <a:ext cx="1961136" cy="0"/>
+            <a:ext cx="1854966" cy="0"/>
           </a:xfrm>
           <a:prstGeom prst="straightConnector1">
             <a:avLst/>
           </a:prstGeom>
           <a:ln w="19050">
             <a:solidFill>
-              <a:srgbClr val="0070C0"/>
+              <a:schemeClr val="accent6">
+                <a:lumMod val="75000"/>
+              </a:schemeClr>
             </a:solidFill>
             <a:prstDash val="sysDash"/>
             <a:headEnd type="arrow" w="med" len="med"/>
@@ -5264,7 +5416,9 @@
           </a:prstGeom>
           <a:ln w="19050">
             <a:solidFill>
-              <a:srgbClr val="0070C0"/>
+              <a:schemeClr val="accent6">
+                <a:lumMod val="75000"/>
+              </a:schemeClr>
             </a:solidFill>
             <a:prstDash val="sysDash"/>
             <a:headEnd type="arrow" w="med" len="med"/>
@@ -5311,7 +5465,9 @@
           </a:prstGeom>
           <a:ln w="19050">
             <a:solidFill>
-              <a:srgbClr val="0070C0"/>
+              <a:schemeClr val="accent6">
+                <a:lumMod val="75000"/>
+              </a:schemeClr>
             </a:solidFill>
             <a:tailEnd type="arrow"/>
           </a:ln>
@@ -5582,15 +5738,17 @@
         </p:nvCxnSpPr>
         <p:spPr>
           <a:xfrm>
-            <a:off x="95250" y="4731213"/>
-            <a:ext cx="1386554" cy="0"/>
+            <a:off x="0" y="4731213"/>
+            <a:ext cx="1481804" cy="0"/>
           </a:xfrm>
           <a:prstGeom prst="straightConnector1">
             <a:avLst/>
           </a:prstGeom>
           <a:ln w="19050">
             <a:solidFill>
-              <a:srgbClr val="0070C0"/>
+              <a:schemeClr val="accent6">
+                <a:lumMod val="75000"/>
+              </a:schemeClr>
             </a:solidFill>
             <a:prstDash val="sysDash"/>
             <a:headEnd type="arrow" w="med" len="med"/>

</xml_diff>